<commit_message>
add html and pptx files
</commit_message>
<xml_diff>
--- a/ModelingAlternativeInspections.pptx
+++ b/ModelingAlternativeInspections.pptx
@@ -5,7 +5,7 @@
     <p:sldMasterId id="2147483648" r:id="rId1"/>
   </p:sldMasterIdLst>
   <p:notesMasterIdLst>
-    <p:notesMasterId r:id="rId17"/>
+    <p:notesMasterId r:id="rId18"/>
   </p:notesMasterIdLst>
   <p:sldIdLst>
     <p:sldId id="256" r:id="rId2"/>
@@ -23,6 +23,7 @@
     <p:sldId id="269" r:id="rId14"/>
     <p:sldId id="270" r:id="rId15"/>
     <p:sldId id="271" r:id="rId16"/>
+    <p:sldId id="272" r:id="rId17"/>
   </p:sldIdLst>
   <p:sldSz cx="9144000" cy="6858000" type="screen4x3"/>
   <p:notesSz cx="6858000" cy="9144000"/>
@@ -121,6 +122,22 @@
       </a:defRPr>
     </a:lvl9pPr>
   </p:defaultTextStyle>
+  <p:extLst>
+    <p:ext uri="{EFAFB233-063F-42B5-8137-9DF3F51BA10A}">
+      <p15:sldGuideLst xmlns:p15="http://schemas.microsoft.com/office/powerpoint/2012/main">
+        <p15:guide id="1" orient="horz" pos="2160">
+          <p15:clr>
+            <a:srgbClr val="A4A3A4"/>
+          </p15:clr>
+        </p15:guide>
+        <p15:guide id="2" pos="2880">
+          <p15:clr>
+            <a:srgbClr val="A4A3A4"/>
+          </p15:clr>
+        </p15:guide>
+      </p15:sldGuideLst>
+    </p:ext>
+  </p:extLst>
 </p:presentation>
 </file>
 
@@ -207,7 +224,7 @@
             <a:fld id="{50C71C72-606A-49FB-835B-33EF247C856C}" type="datetimeFigureOut">
               <a:rPr lang="en-US" smtClean="0"/>
               <a:pPr/>
-              <a:t>6/17/2021</a:t>
+              <a:t>6/24/2023</a:t>
             </a:fld>
             <a:endParaRPr lang="en-US"/>
           </a:p>
@@ -805,7 +822,7 @@
                 <a:ea typeface="+mn-ea"/>
                 <a:cs typeface="+mn-cs"/>
               </a:rPr>
-              <a:t>A typical Markov model of the probability of failure over time reveals a triangular, or “</a:t>
+              <a:t>A typical model of the probability of failure over time reveals a triangular, or “</a:t>
             </a:r>
             <a:r>
               <a:rPr lang="en-US" sz="1200" kern="1200" dirty="0" err="1" smtClean="0">
@@ -2021,7 +2038,7 @@
             <a:fld id="{1D8BD707-D9CF-40AE-B4C6-C98DA3205C09}" type="datetimeFigureOut">
               <a:rPr lang="en-US" smtClean="0"/>
               <a:pPr/>
-              <a:t>6/17/2021</a:t>
+              <a:t>6/24/2023</a:t>
             </a:fld>
             <a:endParaRPr lang="en-US"/>
           </a:p>
@@ -2188,7 +2205,7 @@
             <a:fld id="{1D8BD707-D9CF-40AE-B4C6-C98DA3205C09}" type="datetimeFigureOut">
               <a:rPr lang="en-US" smtClean="0"/>
               <a:pPr/>
-              <a:t>6/17/2021</a:t>
+              <a:t>6/24/2023</a:t>
             </a:fld>
             <a:endParaRPr lang="en-US"/>
           </a:p>
@@ -2365,7 +2382,7 @@
             <a:fld id="{1D8BD707-D9CF-40AE-B4C6-C98DA3205C09}" type="datetimeFigureOut">
               <a:rPr lang="en-US" smtClean="0"/>
               <a:pPr/>
-              <a:t>6/17/2021</a:t>
+              <a:t>6/24/2023</a:t>
             </a:fld>
             <a:endParaRPr lang="en-US"/>
           </a:p>
@@ -2532,7 +2549,7 @@
             <a:fld id="{1D8BD707-D9CF-40AE-B4C6-C98DA3205C09}" type="datetimeFigureOut">
               <a:rPr lang="en-US" smtClean="0"/>
               <a:pPr/>
-              <a:t>6/17/2021</a:t>
+              <a:t>6/24/2023</a:t>
             </a:fld>
             <a:endParaRPr lang="en-US"/>
           </a:p>
@@ -2775,7 +2792,7 @@
             <a:fld id="{1D8BD707-D9CF-40AE-B4C6-C98DA3205C09}" type="datetimeFigureOut">
               <a:rPr lang="en-US" smtClean="0"/>
               <a:pPr/>
-              <a:t>6/17/2021</a:t>
+              <a:t>6/24/2023</a:t>
             </a:fld>
             <a:endParaRPr lang="en-US"/>
           </a:p>
@@ -3060,7 +3077,7 @@
             <a:fld id="{1D8BD707-D9CF-40AE-B4C6-C98DA3205C09}" type="datetimeFigureOut">
               <a:rPr lang="en-US" smtClean="0"/>
               <a:pPr/>
-              <a:t>6/17/2021</a:t>
+              <a:t>6/24/2023</a:t>
             </a:fld>
             <a:endParaRPr lang="en-US"/>
           </a:p>
@@ -3479,7 +3496,7 @@
             <a:fld id="{1D8BD707-D9CF-40AE-B4C6-C98DA3205C09}" type="datetimeFigureOut">
               <a:rPr lang="en-US" smtClean="0"/>
               <a:pPr/>
-              <a:t>6/17/2021</a:t>
+              <a:t>6/24/2023</a:t>
             </a:fld>
             <a:endParaRPr lang="en-US"/>
           </a:p>
@@ -3594,7 +3611,7 @@
             <a:fld id="{1D8BD707-D9CF-40AE-B4C6-C98DA3205C09}" type="datetimeFigureOut">
               <a:rPr lang="en-US" smtClean="0"/>
               <a:pPr/>
-              <a:t>6/17/2021</a:t>
+              <a:t>6/24/2023</a:t>
             </a:fld>
             <a:endParaRPr lang="en-US"/>
           </a:p>
@@ -3686,7 +3703,7 @@
             <a:fld id="{1D8BD707-D9CF-40AE-B4C6-C98DA3205C09}" type="datetimeFigureOut">
               <a:rPr lang="en-US" smtClean="0"/>
               <a:pPr/>
-              <a:t>6/17/2021</a:t>
+              <a:t>6/24/2023</a:t>
             </a:fld>
             <a:endParaRPr lang="en-US"/>
           </a:p>
@@ -3960,7 +3977,7 @@
             <a:fld id="{1D8BD707-D9CF-40AE-B4C6-C98DA3205C09}" type="datetimeFigureOut">
               <a:rPr lang="en-US" smtClean="0"/>
               <a:pPr/>
-              <a:t>6/17/2021</a:t>
+              <a:t>6/24/2023</a:t>
             </a:fld>
             <a:endParaRPr lang="en-US"/>
           </a:p>
@@ -4210,7 +4227,7 @@
             <a:fld id="{1D8BD707-D9CF-40AE-B4C6-C98DA3205C09}" type="datetimeFigureOut">
               <a:rPr lang="en-US" smtClean="0"/>
               <a:pPr/>
-              <a:t>6/17/2021</a:t>
+              <a:t>6/24/2023</a:t>
             </a:fld>
             <a:endParaRPr lang="en-US"/>
           </a:p>
@@ -4420,7 +4437,7 @@
             <a:fld id="{1D8BD707-D9CF-40AE-B4C6-C98DA3205C09}" type="datetimeFigureOut">
               <a:rPr lang="en-US" smtClean="0"/>
               <a:pPr/>
-              <a:t>6/17/2021</a:t>
+              <a:t>6/24/2023</a:t>
             </a:fld>
             <a:endParaRPr lang="en-US"/>
           </a:p>
@@ -4817,7 +4834,7 @@
               <a:buNone/>
             </a:pPr>
             <a:r>
-              <a:rPr lang="en-US" sz="3300" b="1" dirty="0" smtClean="0">
+              <a:rPr lang="en-US" sz="3300" b="1" dirty="0">
                 <a:ln>
                   <a:solidFill>
                     <a:schemeClr val="tx1"/>
@@ -4827,15 +4844,10 @@
                   <a:srgbClr val="0070C0"/>
                 </a:solidFill>
               </a:rPr>
-              <a:t>Modeling Alternative Inspection</a:t>
-            </a:r>
-          </a:p>
-          <a:p>
-            <a:pPr algn="ctr">
-              <a:buNone/>
-            </a:pPr>
-            <a:r>
-              <a:rPr lang="en-US" sz="3300" b="1" dirty="0" smtClean="0">
+              <a:t>Modeling Alternative Inspection Protocols with </a:t>
+            </a:r>
+            <a:r>
+              <a:rPr lang="en-US" sz="3300" b="1" dirty="0" err="1">
                 <a:ln>
                   <a:solidFill>
                     <a:schemeClr val="tx1"/>
@@ -4845,13 +4857,21 @@
                   <a:srgbClr val="0070C0"/>
                 </a:solidFill>
               </a:rPr>
-              <a:t>Protocols for Latent Failures</a:t>
-            </a:r>
-          </a:p>
-          <a:p>
-            <a:pPr algn="ctr">
-              <a:buNone/>
-            </a:pPr>
+              <a:t>FaultTree</a:t>
+            </a:r>
+            <a:r>
+              <a:rPr lang="en-US" sz="3300" b="1" dirty="0">
+                <a:ln>
+                  <a:solidFill>
+                    <a:schemeClr val="tx1"/>
+                  </a:solidFill>
+                </a:ln>
+                <a:solidFill>
+                  <a:srgbClr val="0070C0"/>
+                </a:solidFill>
+              </a:rPr>
+              <a:t> on R</a:t>
+            </a:r>
             <a:endParaRPr lang="en-US" sz="3800" b="1" dirty="0" smtClean="0">
               <a:ln>
                 <a:solidFill>
@@ -4948,7 +4968,7 @@
                 <a:ea typeface="Times New Roman" pitchFamily="18" charset="0"/>
                 <a:cs typeface="Calibri" pitchFamily="34" charset="0"/>
               </a:rPr>
-              <a:t>11</a:t>
+              <a:t>12</a:t>
             </a:r>
             <a:r>
               <a:rPr kumimoji="0" lang="en-GB" sz="2400" b="1" i="0" u="none" strike="noStrike" cap="none" normalizeH="0" baseline="0" dirty="0" smtClean="0">
@@ -5185,7 +5205,7 @@
         <p:spPr>
           <a:xfrm>
             <a:off x="3200400" y="4572000"/>
-            <a:ext cx="2133600" cy="646331"/>
+            <a:ext cx="2133600" cy="369332"/>
           </a:xfrm>
           <a:prstGeom prst="rect">
             <a:avLst/>
@@ -5205,18 +5225,7 @@
                   <a:srgbClr val="9C3A72"/>
                 </a:solidFill>
               </a:rPr>
-              <a:t>Online Event</a:t>
-            </a:r>
-          </a:p>
-          <a:p>
-            <a:pPr algn="ctr"/>
-            <a:r>
-              <a:rPr lang="en-US" dirty="0" smtClean="0">
-                <a:solidFill>
-                  <a:srgbClr val="9C3A72"/>
-                </a:solidFill>
-              </a:rPr>
-              <a:t> June 29,  2021</a:t>
+              <a:t>July 4-6,  2023</a:t>
             </a:r>
             <a:endParaRPr lang="en-US" dirty="0">
               <a:solidFill>
@@ -5243,8 +5252,8 @@
         </p:blipFill>
         <p:spPr bwMode="auto">
           <a:xfrm>
-            <a:off x="3429000" y="2895600"/>
-            <a:ext cx="1447800" cy="542925"/>
+            <a:off x="2209799" y="2701366"/>
+            <a:ext cx="1867040" cy="700140"/>
           </a:xfrm>
           <a:prstGeom prst="rect">
             <a:avLst/>
@@ -5256,6 +5265,36 @@
             <a:headEnd/>
             <a:tailEnd/>
           </a:ln>
+        </p:spPr>
+      </p:pic>
+      <p:pic>
+        <p:nvPicPr>
+          <p:cNvPr id="3" name="Picture 2"/>
+          <p:cNvPicPr>
+            <a:picLocks noChangeAspect="1"/>
+          </p:cNvPicPr>
+          <p:nvPr/>
+        </p:nvPicPr>
+        <p:blipFill>
+          <a:blip r:embed="rId6">
+            <a:extLst>
+              <a:ext uri="{28A0092B-C50C-407E-A947-70E740481C1C}">
+                <a14:useLocalDpi xmlns:a14="http://schemas.microsoft.com/office/drawing/2010/main" val="0"/>
+              </a:ext>
+            </a:extLst>
+          </a:blip>
+          <a:stretch>
+            <a:fillRect/>
+          </a:stretch>
+        </p:blipFill>
+        <p:spPr>
+          <a:xfrm>
+            <a:off x="4559085" y="2701366"/>
+            <a:ext cx="1976437" cy="700140"/>
+          </a:xfrm>
+          <a:prstGeom prst="rect">
+            <a:avLst/>
+          </a:prstGeom>
         </p:spPr>
       </p:pic>
     </p:spTree>
@@ -5307,7 +5346,7 @@
         <p:spPr>
           <a:xfrm>
             <a:off x="685800" y="1066800"/>
-            <a:ext cx="4350637" cy="4100513"/>
+            <a:ext cx="4770036" cy="5257800"/>
           </a:xfrm>
           <a:prstGeom prst="rect">
             <a:avLst/>
@@ -5360,8 +5399,8 @@
         </p:nvSpPr>
         <p:spPr>
           <a:xfrm>
-            <a:off x="2971800" y="3124200"/>
-            <a:ext cx="5715000" cy="3352800"/>
+            <a:off x="5715000" y="1295400"/>
+            <a:ext cx="2971800" cy="5181600"/>
           </a:xfrm>
         </p:spPr>
         <p:txBody>
@@ -5414,23 +5453,15 @@
             </a:r>
             <a:r>
               <a:rPr lang="en-US" sz="2000" dirty="0" smtClean="0"/>
-              <a:t>, at=6, </a:t>
-            </a:r>
-            <a:r>
-              <a:rPr lang="en-US" sz="2000" dirty="0" err="1" smtClean="0"/>
-              <a:t>mttf</a:t>
+              <a:t>, at=6</a:t>
+            </a:r>
+            <a:r>
+              <a:rPr lang="en-US" sz="2000" smtClean="0"/>
+              <a:t>, mttf=10, </a:t>
             </a:r>
             <a:r>
               <a:rPr lang="en-US" sz="2000" dirty="0" smtClean="0"/>
-              <a:t>=10, </a:t>
-            </a:r>
-            <a:r>
-              <a:rPr lang="en-US" sz="2000" dirty="0" err="1" smtClean="0"/>
-              <a:t>pzero</a:t>
-            </a:r>
-            <a:r>
-              <a:rPr lang="en-US" sz="2000" dirty="0" smtClean="0"/>
-              <a:t>=0, inspect=</a:t>
+              <a:t>inspect=</a:t>
             </a:r>
             <a:r>
               <a:rPr lang="en-US" sz="2000" dirty="0" err="1" smtClean="0"/>
@@ -5467,23 +5498,15 @@
             </a:r>
             <a:r>
               <a:rPr lang="en-US" sz="2000" dirty="0" smtClean="0"/>
-              <a:t>, at=6, </a:t>
-            </a:r>
-            <a:r>
-              <a:rPr lang="en-US" sz="2000" dirty="0" err="1" smtClean="0"/>
-              <a:t>mttf</a:t>
+              <a:t>, at=6</a:t>
+            </a:r>
+            <a:r>
+              <a:rPr lang="en-US" sz="2000" smtClean="0"/>
+              <a:t>, mttf=10, </a:t>
             </a:r>
             <a:r>
               <a:rPr lang="en-US" sz="2000" dirty="0" smtClean="0"/>
-              <a:t>=10, </a:t>
-            </a:r>
-            <a:r>
-              <a:rPr lang="en-US" sz="2000" dirty="0" err="1" smtClean="0"/>
-              <a:t>pzero</a:t>
-            </a:r>
-            <a:r>
-              <a:rPr lang="en-US" sz="2000" dirty="0" smtClean="0"/>
-              <a:t>=0, inspect=</a:t>
+              <a:t>inspect=</a:t>
             </a:r>
             <a:r>
               <a:rPr lang="en-US" sz="2000" dirty="0" err="1" smtClean="0"/>
@@ -5547,7 +5570,7 @@
         <p:spPr>
           <a:xfrm>
             <a:off x="0" y="990600"/>
-            <a:ext cx="4029075" cy="4019550"/>
+            <a:ext cx="5410200" cy="5397410"/>
           </a:xfrm>
           <a:prstGeom prst="rect">
             <a:avLst/>
@@ -5600,8 +5623,8 @@
         </p:nvSpPr>
         <p:spPr>
           <a:xfrm>
-            <a:off x="3124200" y="3505200"/>
-            <a:ext cx="5715000" cy="3352800"/>
+            <a:off x="5638800" y="1295400"/>
+            <a:ext cx="3200400" cy="5562600"/>
           </a:xfrm>
         </p:spPr>
         <p:txBody>
@@ -5648,23 +5671,15 @@
             </a:r>
             <a:r>
               <a:rPr lang="en-US" sz="2000" dirty="0" smtClean="0"/>
-              <a:t>, at=15, </a:t>
-            </a:r>
-            <a:r>
-              <a:rPr lang="en-US" sz="2000" dirty="0" err="1" smtClean="0"/>
-              <a:t>mttf</a:t>
+              <a:t>, at=15</a:t>
+            </a:r>
+            <a:r>
+              <a:rPr lang="en-US" sz="2000" smtClean="0"/>
+              <a:t>, mttf=10, </a:t>
             </a:r>
             <a:r>
               <a:rPr lang="en-US" sz="2000" dirty="0" smtClean="0"/>
-              <a:t>=10, </a:t>
-            </a:r>
-            <a:r>
-              <a:rPr lang="en-US" sz="2000" dirty="0" err="1" smtClean="0"/>
-              <a:t>pzero</a:t>
-            </a:r>
-            <a:r>
-              <a:rPr lang="en-US" sz="2000" dirty="0" smtClean="0"/>
-              <a:t>=0, inspect=</a:t>
+              <a:t>inspect=</a:t>
             </a:r>
             <a:r>
               <a:rPr lang="en-US" sz="2000" dirty="0" err="1" smtClean="0"/>
@@ -5701,23 +5716,15 @@
             </a:r>
             <a:r>
               <a:rPr lang="en-US" sz="2000" dirty="0" smtClean="0"/>
-              <a:t>, at=15, </a:t>
-            </a:r>
-            <a:r>
-              <a:rPr lang="en-US" sz="2000" dirty="0" err="1" smtClean="0"/>
-              <a:t>mttf</a:t>
+              <a:t>, at=15</a:t>
+            </a:r>
+            <a:r>
+              <a:rPr lang="en-US" sz="2000" smtClean="0"/>
+              <a:t>, mttf=10, </a:t>
             </a:r>
             <a:r>
               <a:rPr lang="en-US" sz="2000" dirty="0" smtClean="0"/>
-              <a:t>=10, </a:t>
-            </a:r>
-            <a:r>
-              <a:rPr lang="en-US" sz="2000" dirty="0" err="1" smtClean="0"/>
-              <a:t>pzero</a:t>
-            </a:r>
-            <a:r>
-              <a:rPr lang="en-US" sz="2000" dirty="0" smtClean="0"/>
-              <a:t>=0, inspect=</a:t>
+              <a:t>inspect=</a:t>
             </a:r>
             <a:r>
               <a:rPr lang="en-US" sz="2000" dirty="0" err="1" smtClean="0"/>
@@ -5773,7 +5780,7 @@
         <p:spPr>
           <a:xfrm>
             <a:off x="381001" y="1066800"/>
-            <a:ext cx="3915880" cy="2971800"/>
+            <a:ext cx="4919952" cy="4419600"/>
           </a:xfrm>
           <a:prstGeom prst="rect">
             <a:avLst/>
@@ -5826,8 +5833,8 @@
         </p:nvSpPr>
         <p:spPr>
           <a:xfrm>
-            <a:off x="4191000" y="1752600"/>
-            <a:ext cx="4495800" cy="4724400"/>
+            <a:off x="5257800" y="1752600"/>
+            <a:ext cx="3429000" cy="4724400"/>
           </a:xfrm>
         </p:spPr>
         <p:txBody>
@@ -5880,23 +5887,15 @@
             </a:r>
             <a:r>
               <a:rPr lang="en-US" sz="2000" dirty="0" smtClean="0"/>
-              <a:t>, at=21, </a:t>
-            </a:r>
-            <a:r>
-              <a:rPr lang="en-US" sz="2000" dirty="0" err="1" smtClean="0"/>
-              <a:t>mttf</a:t>
+              <a:t>, at=21</a:t>
+            </a:r>
+            <a:r>
+              <a:rPr lang="en-US" sz="2000" smtClean="0"/>
+              <a:t>, mttf=300, </a:t>
             </a:r>
             <a:r>
               <a:rPr lang="en-US" sz="2000" dirty="0" smtClean="0"/>
-              <a:t>=300, </a:t>
-            </a:r>
-            <a:r>
-              <a:rPr lang="en-US" sz="2000" dirty="0" err="1" smtClean="0"/>
-              <a:t>pzero</a:t>
-            </a:r>
-            <a:r>
-              <a:rPr lang="en-US" sz="2000" dirty="0" smtClean="0"/>
-              <a:t>=0, inspect=</a:t>
+              <a:t>inspect=</a:t>
             </a:r>
             <a:r>
               <a:rPr lang="en-US" sz="2000" dirty="0" err="1" smtClean="0"/>
@@ -5939,23 +5938,15 @@
             </a:r>
             <a:r>
               <a:rPr lang="en-US" sz="2000" dirty="0" smtClean="0"/>
-              <a:t>, at=21, </a:t>
-            </a:r>
-            <a:r>
-              <a:rPr lang="en-US" sz="2000" dirty="0" err="1" smtClean="0"/>
-              <a:t>mttf</a:t>
+              <a:t>, at=21</a:t>
+            </a:r>
+            <a:r>
+              <a:rPr lang="en-US" sz="2000" smtClean="0"/>
+              <a:t>, mttf=300, </a:t>
             </a:r>
             <a:r>
               <a:rPr lang="en-US" sz="2000" dirty="0" smtClean="0"/>
-              <a:t>=300, </a:t>
-            </a:r>
-            <a:r>
-              <a:rPr lang="en-US" sz="2000" dirty="0" err="1" smtClean="0"/>
-              <a:t>pzero</a:t>
-            </a:r>
-            <a:r>
-              <a:rPr lang="en-US" sz="2000" dirty="0" smtClean="0"/>
-              <a:t>=0, inspect=</a:t>
+              <a:t>inspect=</a:t>
             </a:r>
             <a:r>
               <a:rPr lang="en-US" sz="2000" dirty="0" err="1" smtClean="0"/>
@@ -6036,13 +6027,13 @@
         </p:nvSpPr>
         <p:spPr>
           <a:xfrm>
-            <a:off x="1752600" y="1600201"/>
-            <a:ext cx="6934200" cy="4114800"/>
+            <a:off x="914400" y="1142999"/>
+            <a:ext cx="7543800" cy="4724401"/>
           </a:xfrm>
         </p:spPr>
         <p:txBody>
           <a:bodyPr>
-            <a:normAutofit fontScale="62500" lnSpcReduction="20000"/>
+            <a:normAutofit fontScale="70000" lnSpcReduction="20000"/>
           </a:bodyPr>
           <a:lstStyle/>
           <a:p>
@@ -6152,7 +6143,19 @@
             </a:pPr>
             <a:r>
               <a:rPr lang="en-US" dirty="0" smtClean="0"/>
-              <a:t>for(case in 1:dim(cases)[1]) {</a:t>
+              <a:t>for(case </a:t>
+            </a:r>
+            <a:r>
+              <a:rPr lang="en-US" smtClean="0"/>
+              <a:t>in </a:t>
+            </a:r>
+            <a:r>
+              <a:rPr lang="en-US" smtClean="0"/>
+              <a:t>1:nrow(cases)) </a:t>
+            </a:r>
+            <a:r>
+              <a:rPr lang="en-US" dirty="0" smtClean="0"/>
+              <a:t>{</a:t>
             </a:r>
           </a:p>
           <a:p>
@@ -6306,7 +6309,7 @@
         <p:spPr>
           <a:xfrm>
             <a:off x="533400" y="1371601"/>
-            <a:ext cx="4038600" cy="2057399"/>
+            <a:ext cx="3886200" cy="2057399"/>
           </a:xfrm>
         </p:spPr>
         <p:txBody>
@@ -6442,13 +6445,8 @@
           <a:p>
             <a:r>
               <a:rPr lang="en-US" sz="1600" dirty="0" smtClean="0"/>
-              <a:t>https://raw.githubusercontent.com/openrelia</a:t>
-            </a:r>
-            <a:r>
-              <a:rPr lang="en-US" sz="1600" dirty="0" smtClean="0"/>
-              <a:t>//ModelingAlternativeInspections/hf_cases.r</a:t>
-            </a:r>
-            <a:endParaRPr lang="en-US" sz="1600" dirty="0" smtClean="0"/>
+              <a:t>https://raw.githubusercontent.com/openrelia//ModelingAlternativeInspections/hf_cases.r</a:t>
+            </a:r>
           </a:p>
           <a:p>
             <a:endParaRPr lang="en-US" dirty="0"/>
@@ -6672,69 +6670,205 @@
         </p:nvSpPr>
         <p:spPr/>
         <p:txBody>
-          <a:bodyPr/>
-          <a:lstStyle/>
-          <a:p>
-            <a:r>
-              <a:rPr lang="en-US" dirty="0" smtClean="0"/>
-              <a:t>Closing Thoughts</a:t>
-            </a:r>
-            <a:endParaRPr lang="en-US" dirty="0"/>
-          </a:p>
-        </p:txBody>
-      </p:sp>
-      <p:sp>
-        <p:nvSpPr>
-          <p:cNvPr id="3" name="Content Placeholder 2"/>
-          <p:cNvSpPr>
-            <a:spLocks noGrp="1"/>
-          </p:cNvSpPr>
-          <p:nvPr>
-            <p:ph idx="1"/>
-          </p:nvPr>
-        </p:nvSpPr>
-        <p:spPr/>
-        <p:txBody>
           <a:bodyPr>
             <a:normAutofit/>
           </a:bodyPr>
           <a:lstStyle/>
           <a:p>
             <a:r>
-              <a:rPr lang="en-US" sz="2400" dirty="0" smtClean="0"/>
+              <a:rPr lang="en-US" sz="3600" b="1" smtClean="0">
+                <a:solidFill>
+                  <a:schemeClr val="accent6">
+                    <a:lumMod val="75000"/>
+                  </a:schemeClr>
+                </a:solidFill>
+              </a:rPr>
+              <a:t>Closing Thoughts – Design for Reliability</a:t>
+            </a:r>
+            <a:endParaRPr lang="en-US" sz="3600" b="1" dirty="0">
+              <a:solidFill>
+                <a:schemeClr val="accent6">
+                  <a:lumMod val="75000"/>
+                </a:schemeClr>
+              </a:solidFill>
+            </a:endParaRPr>
+          </a:p>
+        </p:txBody>
+      </p:sp>
+      <p:sp>
+        <p:nvSpPr>
+          <p:cNvPr id="3" name="Content Placeholder 2"/>
+          <p:cNvSpPr>
+            <a:spLocks noGrp="1"/>
+          </p:cNvSpPr>
+          <p:nvPr>
+            <p:ph idx="1"/>
+          </p:nvPr>
+        </p:nvSpPr>
+        <p:spPr>
+          <a:xfrm>
+            <a:off x="429986" y="1417638"/>
+            <a:ext cx="8229600" cy="4983162"/>
+          </a:xfrm>
+        </p:spPr>
+        <p:txBody>
+          <a:bodyPr>
+            <a:noAutofit/>
+          </a:bodyPr>
+          <a:lstStyle/>
+          <a:p>
+            <a:r>
+              <a:rPr lang="en-US" sz="2800" dirty="0" smtClean="0"/>
               <a:t>Inspection opportunities need to be sought out early in  a system design.</a:t>
             </a:r>
           </a:p>
           <a:p>
             <a:r>
-              <a:rPr lang="en-US" sz="2400" dirty="0" smtClean="0"/>
+              <a:rPr lang="en-US" sz="2800" dirty="0" smtClean="0"/>
               <a:t>Often particular assets must be added to the system that enable certain tests without system interruption.</a:t>
             </a:r>
           </a:p>
           <a:p>
             <a:r>
-              <a:rPr lang="en-US" sz="2400" dirty="0" smtClean="0"/>
+              <a:rPr lang="en-US" sz="2800" dirty="0" smtClean="0"/>
               <a:t>Costs of inspections can vary depending on staffing resources.</a:t>
             </a:r>
           </a:p>
           <a:p>
             <a:r>
-              <a:rPr lang="en-US" sz="2400" dirty="0" smtClean="0"/>
-              <a:t>At times we have considered </a:t>
-            </a:r>
-            <a:r>
-              <a:rPr lang="en-US" sz="2400" dirty="0" err="1" smtClean="0"/>
-              <a:t>instrumenting</a:t>
-            </a:r>
-            <a:r>
-              <a:rPr lang="en-US" sz="2400" dirty="0" smtClean="0"/>
-              <a:t> systems to provide data on protective system performance so as to consider a response to demand to be an inspection.</a:t>
-            </a:r>
-            <a:endParaRPr lang="en-US" sz="2400" dirty="0"/>
+              <a:rPr lang="en-US" sz="2800" dirty="0" smtClean="0"/>
+              <a:t>At times we have considered instrumenting systems to provide data on protective system performance so as to consider a response to demand to be an </a:t>
+            </a:r>
+            <a:r>
+              <a:rPr lang="en-US" sz="2800" smtClean="0"/>
+              <a:t>inspection.</a:t>
+            </a:r>
           </a:p>
         </p:txBody>
       </p:sp>
     </p:spTree>
+  </p:cSld>
+  <p:clrMapOvr>
+    <a:masterClrMapping/>
+  </p:clrMapOvr>
+</p:sld>
+</file>
+
+<file path=ppt/slides/slide16.xml><?xml version="1.0" encoding="utf-8"?>
+<p:sld xmlns:a="http://schemas.openxmlformats.org/drawingml/2006/main" xmlns:r="http://schemas.openxmlformats.org/officeDocument/2006/relationships" xmlns:p="http://schemas.openxmlformats.org/presentationml/2006/main">
+  <p:cSld>
+    <p:spTree>
+      <p:nvGrpSpPr>
+        <p:cNvPr id="1" name=""/>
+        <p:cNvGrpSpPr/>
+        <p:nvPr/>
+      </p:nvGrpSpPr>
+      <p:grpSpPr>
+        <a:xfrm>
+          <a:off x="0" y="0"/>
+          <a:ext cx="0" cy="0"/>
+          <a:chOff x="0" y="0"/>
+          <a:chExt cx="0" cy="0"/>
+        </a:xfrm>
+      </p:grpSpPr>
+      <p:sp>
+        <p:nvSpPr>
+          <p:cNvPr id="2" name="Title 1"/>
+          <p:cNvSpPr>
+            <a:spLocks noGrp="1"/>
+          </p:cNvSpPr>
+          <p:nvPr>
+            <p:ph type="title"/>
+          </p:nvPr>
+        </p:nvSpPr>
+        <p:spPr>
+          <a:xfrm>
+            <a:off x="457200" y="990600"/>
+            <a:ext cx="8229600" cy="1143000"/>
+          </a:xfrm>
+        </p:spPr>
+        <p:txBody>
+          <a:bodyPr>
+            <a:normAutofit/>
+          </a:bodyPr>
+          <a:lstStyle/>
+          <a:p>
+            <a:r>
+              <a:rPr lang="en-US" sz="3600" b="1" smtClean="0">
+                <a:solidFill>
+                  <a:srgbClr val="0070C0"/>
+                </a:solidFill>
+              </a:rPr>
+              <a:t>Closing Thoughts – Using FaultTree on R</a:t>
+            </a:r>
+            <a:endParaRPr lang="en-US" sz="3600" b="1">
+              <a:solidFill>
+                <a:srgbClr val="0070C0"/>
+              </a:solidFill>
+            </a:endParaRPr>
+          </a:p>
+        </p:txBody>
+      </p:sp>
+      <p:sp>
+        <p:nvSpPr>
+          <p:cNvPr id="3" name="Content Placeholder 2"/>
+          <p:cNvSpPr>
+            <a:spLocks noGrp="1"/>
+          </p:cNvSpPr>
+          <p:nvPr>
+            <p:ph idx="1"/>
+          </p:nvPr>
+        </p:nvSpPr>
+        <p:spPr>
+          <a:xfrm>
+            <a:off x="457200" y="2438401"/>
+            <a:ext cx="8229600" cy="3352800"/>
+          </a:xfrm>
+        </p:spPr>
+        <p:txBody>
+          <a:bodyPr/>
+          <a:lstStyle/>
+          <a:p>
+            <a:r>
+              <a:rPr lang="en-US"/>
+              <a:t>Using a fault tree application that resides within the R statistical computing environment facilitates unique techniques for automating alternative tree inputs and summarizing results.</a:t>
+            </a:r>
+          </a:p>
+          <a:p>
+            <a:endParaRPr lang="en-US"/>
+          </a:p>
+        </p:txBody>
+      </p:sp>
+      <p:pic>
+        <p:nvPicPr>
+          <p:cNvPr id="4" name="Picture 3" descr="ORheader.jpg"/>
+          <p:cNvPicPr>
+            <a:picLocks noChangeAspect="1"/>
+          </p:cNvPicPr>
+          <p:nvPr/>
+        </p:nvPicPr>
+        <p:blipFill>
+          <a:blip r:embed="rId2" cstate="print"/>
+          <a:stretch>
+            <a:fillRect/>
+          </a:stretch>
+        </p:blipFill>
+        <p:spPr>
+          <a:xfrm>
+            <a:off x="-1" y="0"/>
+            <a:ext cx="9144001" cy="1072852"/>
+          </a:xfrm>
+          <a:prstGeom prst="rect">
+            <a:avLst/>
+          </a:prstGeom>
+        </p:spPr>
+      </p:pic>
+    </p:spTree>
+    <p:extLst>
+      <p:ext uri="{BB962C8B-B14F-4D97-AF65-F5344CB8AC3E}">
+        <p14:creationId xmlns:p14="http://schemas.microsoft.com/office/powerpoint/2010/main" val="382003354"/>
+      </p:ext>
+    </p:extLst>
   </p:cSld>
   <p:clrMapOvr>
     <a:masterClrMapping/>
@@ -6817,8 +6951,8 @@
         </p:nvSpPr>
         <p:spPr>
           <a:xfrm>
-            <a:off x="609600" y="1371600"/>
-            <a:ext cx="7924800" cy="3970318"/>
+            <a:off x="542441" y="927586"/>
+            <a:ext cx="7467600" cy="5355312"/>
           </a:xfrm>
           <a:prstGeom prst="rect">
             <a:avLst/>
@@ -6891,16 +7025,103 @@
                   <a:srgbClr val="008000"/>
                 </a:solidFill>
               </a:rPr>
+              <a:t> Weibull</a:t>
+            </a:r>
+          </a:p>
+          <a:p>
+            <a:pPr lvl="1">
+              <a:buFont typeface="Arial" pitchFamily="34" charset="0"/>
+              <a:buChar char="•"/>
+            </a:pPr>
+            <a:r>
+              <a:rPr lang="en-US" b="1" dirty="0" err="1" smtClean="0">
+                <a:solidFill>
+                  <a:srgbClr val="008000"/>
+                </a:solidFill>
+              </a:rPr>
+              <a:t>WeibullR.ALT</a:t>
+            </a:r>
+            <a:r>
+              <a:rPr lang="en-US" b="1" dirty="0" smtClean="0">
+                <a:solidFill>
+                  <a:srgbClr val="008000"/>
+                </a:solidFill>
+              </a:rPr>
               <a:t> </a:t>
             </a:r>
             <a:r>
+              <a:rPr lang="en-US" b="1" dirty="0">
+                <a:solidFill>
+                  <a:srgbClr val="008000"/>
+                </a:solidFill>
+              </a:rPr>
+              <a:t>– </a:t>
+            </a:r>
+            <a:r>
+              <a:rPr lang="en-US" b="1" dirty="0" smtClean="0">
+                <a:solidFill>
+                  <a:srgbClr val="008000"/>
+                </a:solidFill>
+              </a:rPr>
+              <a:t>Accelerated Life Testing</a:t>
+            </a:r>
+          </a:p>
+          <a:p>
+            <a:pPr lvl="1">
+              <a:buFont typeface="Arial" pitchFamily="34" charset="0"/>
+              <a:buChar char="•"/>
+            </a:pPr>
+            <a:r>
               <a:rPr lang="en-US" b="1" dirty="0" err="1" smtClean="0">
                 <a:solidFill>
                   <a:srgbClr val="008000"/>
                 </a:solidFill>
               </a:rPr>
-              <a:t>Weibull</a:t>
-            </a:r>
+              <a:t>w</a:t>
+            </a:r>
+            <a:r>
+              <a:rPr lang="en-US" b="1" dirty="0" err="1">
+                <a:solidFill>
+                  <a:srgbClr val="008000"/>
+                </a:solidFill>
+              </a:rPr>
+              <a:t>rg</a:t>
+            </a:r>
+            <a:r>
+              <a:rPr lang="en-US" b="1" dirty="0">
+                <a:solidFill>
+                  <a:srgbClr val="008000"/>
+                </a:solidFill>
+              </a:rPr>
+              <a:t> – </a:t>
+            </a:r>
+            <a:r>
+              <a:rPr lang="en-US" b="1" dirty="0" smtClean="0">
+                <a:solidFill>
+                  <a:srgbClr val="008000"/>
+                </a:solidFill>
+              </a:rPr>
+              <a:t> Gamma distribution support for </a:t>
+            </a:r>
+            <a:r>
+              <a:rPr lang="en-US" b="1" dirty="0" err="1" smtClean="0">
+                <a:solidFill>
+                  <a:srgbClr val="008000"/>
+                </a:solidFill>
+              </a:rPr>
+              <a:t>WeibullR</a:t>
+            </a:r>
+            <a:r>
+              <a:rPr lang="en-US" b="1" dirty="0" smtClean="0">
+                <a:solidFill>
+                  <a:srgbClr val="008000"/>
+                </a:solidFill>
+              </a:rPr>
+              <a:t> </a:t>
+            </a:r>
+          </a:p>
+          <a:p>
+            <a:pPr lvl="1"/>
             <a:endParaRPr lang="en-US" b="1" dirty="0" smtClean="0">
               <a:solidFill>
                 <a:srgbClr val="008000"/>
@@ -6912,17 +7133,6 @@
               <a:buFont typeface="Arial" pitchFamily="34" charset="0"/>
               <a:buChar char="•"/>
             </a:pPr>
-            <a:endParaRPr lang="en-US" b="1" dirty="0" smtClean="0">
-              <a:solidFill>
-                <a:srgbClr val="008000"/>
-              </a:solidFill>
-            </a:endParaRPr>
-          </a:p>
-          <a:p>
-            <a:pPr>
-              <a:buFont typeface="Arial" pitchFamily="34" charset="0"/>
-              <a:buChar char="•"/>
-            </a:pPr>
             <a:r>
               <a:rPr lang="en-US" b="1" dirty="0" smtClean="0">
                 <a:solidFill>
@@ -7044,6 +7254,14 @@
               <a:t>Stosim</a:t>
             </a:r>
             <a:r>
+              <a:rPr lang="en-US" b="1" dirty="0">
+                <a:solidFill>
+                  <a:schemeClr val="accent1"/>
+                </a:solidFill>
+              </a:rPr>
+              <a:t> – </a:t>
+            </a:r>
+            <a:r>
               <a:rPr lang="en-US" b="1" dirty="0" smtClean="0">
                 <a:solidFill>
                   <a:schemeClr val="accent5">
@@ -7051,9 +7269,42 @@
                   </a:schemeClr>
                 </a:solidFill>
               </a:rPr>
-              <a:t> -Stochastic Simulator for Reliability Analysis</a:t>
-            </a:r>
-            <a:endParaRPr lang="en-US" dirty="0" smtClean="0"/>
+              <a:t>Stochastic Simulator for Reliability Analysis</a:t>
+            </a:r>
+          </a:p>
+          <a:p>
+            <a:pPr lvl="1">
+              <a:buFont typeface="Arial" pitchFamily="34" charset="0"/>
+              <a:buChar char="•"/>
+            </a:pPr>
+            <a:r>
+              <a:rPr lang="en-US" b="1" dirty="0" err="1" smtClean="0">
+                <a:solidFill>
+                  <a:schemeClr val="accent5">
+                    <a:lumMod val="75000"/>
+                  </a:schemeClr>
+                </a:solidFill>
+              </a:rPr>
+              <a:t>dem</a:t>
+            </a:r>
+            <a:r>
+              <a:rPr lang="en-US" b="1" dirty="0">
+                <a:solidFill>
+                  <a:schemeClr val="accent1"/>
+                </a:solidFill>
+              </a:rPr>
+              <a:t> </a:t>
+            </a:r>
+            <a:r>
+              <a:rPr lang="en-US" b="1" dirty="0">
+                <a:solidFill>
+                  <a:schemeClr val="accent5">
+                    <a:lumMod val="75000"/>
+                  </a:schemeClr>
+                </a:solidFill>
+              </a:rPr>
+              <a:t>– Discrete Event Modeler</a:t>
+            </a:r>
           </a:p>
           <a:p>
             <a:endParaRPr lang="en-US" dirty="0" smtClean="0"/>
@@ -7419,8 +7670,8 @@
         </p:blipFill>
         <p:spPr bwMode="auto">
           <a:xfrm>
-            <a:off x="2133600" y="2209800"/>
-            <a:ext cx="4545001" cy="3276600"/>
+            <a:off x="1371600" y="1417638"/>
+            <a:ext cx="6400800" cy="4373562"/>
           </a:xfrm>
           <a:prstGeom prst="rect">
             <a:avLst/>
@@ -7459,13 +7710,8 @@
           <a:p>
             <a:r>
               <a:rPr lang="en-US" sz="1500" dirty="0" smtClean="0"/>
-              <a:t>https://</a:t>
-            </a:r>
-            <a:r>
-              <a:rPr lang="en-US" sz="1500" dirty="0" smtClean="0"/>
-              <a:t>raw.githubusercontent.com/openrelia/ModelingAlternativeInspections/Inspection.r</a:t>
-            </a:r>
-            <a:endParaRPr lang="en-US" sz="1500" dirty="0" smtClean="0"/>
+              <a:t>https://raw.githubusercontent.com/openrelia/ModelingAlternativeInspections/Inspection.r</a:t>
+            </a:r>
           </a:p>
           <a:p>
             <a:endParaRPr lang="en-US" dirty="0"/>
@@ -7675,8 +7921,8 @@
         </p:blipFill>
         <p:spPr>
           <a:xfrm>
-            <a:off x="304800" y="1371600"/>
-            <a:ext cx="2057400" cy="3352800"/>
+            <a:off x="152400" y="1371600"/>
+            <a:ext cx="2514600" cy="3886200"/>
           </a:xfrm>
           <a:prstGeom prst="rect">
             <a:avLst/>
@@ -7818,8 +8064,8 @@
         </p:nvSpPr>
         <p:spPr>
           <a:xfrm>
-            <a:off x="2362200" y="1905000"/>
-            <a:ext cx="6324600" cy="3505200"/>
+            <a:off x="4648200" y="1295400"/>
+            <a:ext cx="4495800" cy="5410200"/>
           </a:xfrm>
         </p:spPr>
         <p:txBody>
@@ -7926,7 +8172,7 @@
         <p:spPr>
           <a:xfrm>
             <a:off x="304800" y="1295400"/>
-            <a:ext cx="2133600" cy="3733800"/>
+            <a:ext cx="3810000" cy="5105400"/>
           </a:xfrm>
           <a:prstGeom prst="rect">
             <a:avLst/>
@@ -8066,7 +8312,7 @@
           </p:nvPr>
         </p:nvPicPr>
         <p:blipFill>
-          <a:blip r:embed="rId3"/>
+          <a:blip r:embed="rId4"/>
           <a:stretch>
             <a:fillRect/>
           </a:stretch>
@@ -8086,8 +8332,8 @@
         </p:nvSpPr>
         <p:spPr>
           <a:xfrm>
-            <a:off x="381000" y="5638800"/>
-            <a:ext cx="8077200" cy="615553"/>
+            <a:off x="775758" y="5486400"/>
+            <a:ext cx="8077200" cy="369332"/>
           </a:xfrm>
           <a:prstGeom prst="rect">
             <a:avLst/>
@@ -8101,20 +8347,72 @@
           <a:lstStyle/>
           <a:p>
             <a:r>
-              <a:rPr lang="en-US" sz="1600" dirty="0" smtClean="0"/>
-              <a:t>https://</a:t>
-            </a:r>
-            <a:r>
-              <a:rPr lang="en-US" sz="1600" dirty="0" smtClean="0"/>
-              <a:t>raw.githubusercontent.com/openrelia/ModelingAlternativeInspections/hf.r</a:t>
-            </a:r>
-            <a:endParaRPr lang="en-US" sz="1600" dirty="0" smtClean="0"/>
-          </a:p>
-          <a:p>
+              <a:rPr lang="en-US" dirty="0" smtClean="0">
+                <a:hlinkClick r:id="rId5"/>
+              </a:rPr>
+              <a:t>https://github.com/openrelia/ModelingAlternativeInspections/blob/main/hf.r</a:t>
+            </a:r>
             <a:endParaRPr lang="en-US" dirty="0"/>
           </a:p>
         </p:txBody>
       </p:sp>
+      <p:graphicFrame>
+        <p:nvGraphicFramePr>
+          <p:cNvPr id="3" name="Object 2"/>
+          <p:cNvGraphicFramePr>
+            <a:graphicFrameLocks noChangeAspect="1"/>
+          </p:cNvGraphicFramePr>
+          <p:nvPr>
+            <p:extLst>
+              <p:ext uri="{D42A27DB-BD31-4B8C-83A1-F6EECF244321}">
+                <p14:modId xmlns:p14="http://schemas.microsoft.com/office/powerpoint/2010/main" val="216474716"/>
+              </p:ext>
+            </p:extLst>
+          </p:nvPr>
+        </p:nvGraphicFramePr>
+        <p:xfrm>
+          <a:off x="1017588" y="1219200"/>
+          <a:ext cx="919162" cy="990600"/>
+        </p:xfrm>
+        <a:graphic>
+          <a:graphicData uri="http://schemas.openxmlformats.org/presentationml/2006/ole">
+            <mc:AlternateContent xmlns:mc="http://schemas.openxmlformats.org/markup-compatibility/2006">
+              <mc:Choice xmlns:v="urn:schemas-microsoft-com:vml" Requires="v">
+                <p:oleObj spid="_x0000_s1027" name="Packager Shell Object" showAsIcon="1" r:id="rId6" imgW="488520" imgH="527400" progId="Package">
+                  <p:embed/>
+                </p:oleObj>
+              </mc:Choice>
+              <mc:Fallback>
+                <p:oleObj name="Packager Shell Object" showAsIcon="1" r:id="rId6" imgW="488520" imgH="527400" progId="Package">
+                  <p:embed/>
+                  <p:pic>
+                    <p:nvPicPr>
+                      <p:cNvPr id="0" name=""/>
+                      <p:cNvPicPr/>
+                      <p:nvPr/>
+                    </p:nvPicPr>
+                    <p:blipFill>
+                      <a:blip r:embed="rId7"/>
+                      <a:stretch>
+                        <a:fillRect/>
+                      </a:stretch>
+                    </p:blipFill>
+                    <p:spPr>
+                      <a:xfrm>
+                        <a:off x="1017588" y="1219200"/>
+                        <a:ext cx="919162" cy="990600"/>
+                      </a:xfrm>
+                      <a:prstGeom prst="rect">
+                        <a:avLst/>
+                      </a:prstGeom>
+                    </p:spPr>
+                  </p:pic>
+                </p:oleObj>
+              </mc:Fallback>
+            </mc:AlternateContent>
+          </a:graphicData>
+        </a:graphic>
+      </p:graphicFrame>
     </p:spTree>
   </p:cSld>
   <p:clrMapOvr>

</xml_diff>